<commit_message>
Improved Presentation, Removed old ppt and saved a PDF version
</commit_message>
<xml_diff>
--- a/presentation/Unobtrusive_Javascript.pptx
+++ b/presentation/Unobtrusive_Javascript.pptx
@@ -402,7 +402,7 @@
             <a:fld id="{1D8BD707-D9CF-40AE-B4C6-C98DA3205C09}" type="datetimeFigureOut">
               <a:rPr lang="en-US" smtClean="0"/>
               <a:pPr/>
-              <a:t>6/24/2009</a:t>
+              <a:t>6/25/2009</a:t>
             </a:fld>
             <a:endParaRPr lang="en-US"/>
           </a:p>
@@ -595,7 +595,7 @@
             <a:fld id="{1D8BD707-D9CF-40AE-B4C6-C98DA3205C09}" type="datetimeFigureOut">
               <a:rPr lang="en-US" smtClean="0"/>
               <a:pPr/>
-              <a:t>6/24/2009</a:t>
+              <a:t>6/25/2009</a:t>
             </a:fld>
             <a:endParaRPr lang="en-US"/>
           </a:p>
@@ -782,7 +782,7 @@
             <a:fld id="{1D8BD707-D9CF-40AE-B4C6-C98DA3205C09}" type="datetimeFigureOut">
               <a:rPr lang="en-US" smtClean="0"/>
               <a:pPr/>
-              <a:t>6/24/2009</a:t>
+              <a:t>6/25/2009</a:t>
             </a:fld>
             <a:endParaRPr lang="en-US"/>
           </a:p>
@@ -1047,7 +1047,7 @@
             <a:fld id="{1D8BD707-D9CF-40AE-B4C6-C98DA3205C09}" type="datetimeFigureOut">
               <a:rPr lang="en-US" smtClean="0"/>
               <a:pPr/>
-              <a:t>6/24/2009</a:t>
+              <a:t>6/25/2009</a:t>
             </a:fld>
             <a:endParaRPr lang="en-US"/>
           </a:p>
@@ -1465,7 +1465,7 @@
             <a:fld id="{1D8BD707-D9CF-40AE-B4C6-C98DA3205C09}" type="datetimeFigureOut">
               <a:rPr lang="en-US" smtClean="0"/>
               <a:pPr/>
-              <a:t>6/24/2009</a:t>
+              <a:t>6/25/2009</a:t>
             </a:fld>
             <a:endParaRPr lang="en-US"/>
           </a:p>
@@ -1709,7 +1709,7 @@
             <a:fld id="{1D8BD707-D9CF-40AE-B4C6-C98DA3205C09}" type="datetimeFigureOut">
               <a:rPr lang="en-US" smtClean="0"/>
               <a:pPr/>
-              <a:t>6/24/2009</a:t>
+              <a:t>6/25/2009</a:t>
             </a:fld>
             <a:endParaRPr lang="en-US"/>
           </a:p>
@@ -1947,7 +1947,7 @@
             <a:fld id="{1D8BD707-D9CF-40AE-B4C6-C98DA3205C09}" type="datetimeFigureOut">
               <a:rPr lang="en-US" smtClean="0"/>
               <a:pPr/>
-              <a:t>6/24/2009</a:t>
+              <a:t>6/25/2009</a:t>
             </a:fld>
             <a:endParaRPr lang="en-US"/>
           </a:p>
@@ -2144,7 +2144,7 @@
             <a:fld id="{1D8BD707-D9CF-40AE-B4C6-C98DA3205C09}" type="datetimeFigureOut">
               <a:rPr lang="en-US" smtClean="0"/>
               <a:pPr/>
-              <a:t>6/24/2009</a:t>
+              <a:t>6/25/2009</a:t>
             </a:fld>
             <a:endParaRPr lang="en-US"/>
           </a:p>
@@ -2244,7 +2244,7 @@
             <a:fld id="{1D8BD707-D9CF-40AE-B4C6-C98DA3205C09}" type="datetimeFigureOut">
               <a:rPr lang="en-US" smtClean="0"/>
               <a:pPr/>
-              <a:t>6/24/2009</a:t>
+              <a:t>6/25/2009</a:t>
             </a:fld>
             <a:endParaRPr lang="en-US"/>
           </a:p>
@@ -2382,7 +2382,7 @@
             <a:fld id="{1D8BD707-D9CF-40AE-B4C6-C98DA3205C09}" type="datetimeFigureOut">
               <a:rPr lang="en-US" smtClean="0"/>
               <a:pPr/>
-              <a:t>6/24/2009</a:t>
+              <a:t>6/25/2009</a:t>
             </a:fld>
             <a:endParaRPr lang="en-US"/>
           </a:p>
@@ -2902,7 +2902,7 @@
             <a:fld id="{1D8BD707-D9CF-40AE-B4C6-C98DA3205C09}" type="datetimeFigureOut">
               <a:rPr lang="en-US" smtClean="0"/>
               <a:pPr/>
-              <a:t>6/24/2009</a:t>
+              <a:t>6/25/2009</a:t>
             </a:fld>
             <a:endParaRPr lang="en-US"/>
           </a:p>
@@ -3165,7 +3165,7 @@
             <a:fld id="{1D8BD707-D9CF-40AE-B4C6-C98DA3205C09}" type="datetimeFigureOut">
               <a:rPr lang="en-US" smtClean="0"/>
               <a:pPr/>
-              <a:t>6/24/2009</a:t>
+              <a:t>6/25/2009</a:t>
             </a:fld>
             <a:endParaRPr lang="en-US"/>
           </a:p>
@@ -3742,20 +3742,23 @@
         </p:nvSpPr>
         <p:spPr/>
         <p:txBody>
-          <a:bodyPr/>
-          <a:lstStyle/>
-          <a:p>
-            <a:r>
-              <a:rPr lang="en-CA" dirty="0" smtClean="0"/>
-              <a:t>Unobtrusive </a:t>
-            </a:r>
-            <a:r>
-              <a:rPr lang="en-CA" dirty="0" smtClean="0"/>
-              <a:t>JavaScript</a:t>
-            </a:r>
-            <a:r>
-              <a:rPr lang="en-CA" dirty="0" smtClean="0"/>
-              <a:t/>
+          <a:bodyPr>
+            <a:scene3d>
+              <a:camera prst="orthographicFront"/>
+              <a:lightRig rig="twoPt" dir="t"/>
+            </a:scene3d>
+            <a:sp3d prstMaterial="dkEdge">
+              <a:bevelT w="50800" h="38100"/>
+              <a:extrusionClr>
+                <a:schemeClr val="bg1"/>
+              </a:extrusionClr>
+            </a:sp3d>
+          </a:bodyPr>
+          <a:lstStyle/>
+          <a:p>
+            <a:r>
+              <a:rPr lang="en-CA" dirty="0" smtClean="0"/>
+              <a:t>Unobtrusive JavaScript</a:t>
             </a:r>
             <a:br>
               <a:rPr lang="en-CA" dirty="0" smtClean="0"/>
@@ -3899,11 +3902,7 @@
           <a:p>
             <a:r>
               <a:rPr lang="en-CA" b="1" dirty="0" smtClean="0"/>
-              <a:t>Progressive </a:t>
-            </a:r>
-            <a:r>
-              <a:rPr lang="en-CA" b="1" dirty="0" smtClean="0"/>
-              <a:t>enhancement</a:t>
+              <a:t>Progressive enhancement</a:t>
             </a:r>
             <a:r>
               <a:rPr lang="en-CA" dirty="0" smtClean="0"/>
@@ -3917,11 +3916,7 @@
             </a:r>
             <a:r>
               <a:rPr lang="en-CA" dirty="0" smtClean="0"/>
-              <a:t>(the "behaviour layer") from a Web page's structure/content and </a:t>
-            </a:r>
-            <a:r>
-              <a:rPr lang="en-CA" dirty="0" smtClean="0"/>
-              <a:t>presentation</a:t>
+              <a:t>(the "behaviour layer") from a Web page's structure/content and presentation</a:t>
             </a:r>
           </a:p>
           <a:p>
@@ -4044,11 +4039,7 @@
             </a:pPr>
             <a:r>
               <a:rPr lang="en-CA" dirty="0" smtClean="0"/>
-              <a:t>&lt;input </a:t>
-            </a:r>
-            <a:r>
-              <a:rPr lang="en-CA" dirty="0" smtClean="0"/>
-              <a:t>name="</a:t>
+              <a:t>&lt;input name="</a:t>
             </a:r>
             <a:r>
               <a:rPr lang="en-CA" dirty="0" err="1" smtClean="0"/>
@@ -4056,22 +4047,14 @@
             </a:r>
             <a:r>
               <a:rPr lang="en-CA" dirty="0" smtClean="0"/>
-              <a:t>[1][complete]" type="hidden" value="0" </a:t>
-            </a:r>
-            <a:r>
-              <a:rPr lang="en-CA" dirty="0" smtClean="0"/>
-              <a:t>/&gt;</a:t>
+              <a:t>[1][complete]" type="hidden" value="0" /&gt;</a:t>
             </a:r>
             <a:br>
               <a:rPr lang="en-CA" dirty="0" smtClean="0"/>
             </a:br>
             <a:r>
               <a:rPr lang="en-CA" dirty="0" smtClean="0"/>
-              <a:t>&lt;</a:t>
-            </a:r>
-            <a:r>
-              <a:rPr lang="en-CA" dirty="0" smtClean="0"/>
-              <a:t>input id="todos_1_complete" name="</a:t>
+              <a:t>&lt;input id="todos_1_complete" name="</a:t>
             </a:r>
             <a:r>
               <a:rPr lang="en-CA" dirty="0" err="1" smtClean="0"/>
@@ -4079,22 +4062,14 @@
             </a:r>
             <a:r>
               <a:rPr lang="en-CA" dirty="0" smtClean="0"/>
-              <a:t>[1][complete]" type="checkbox" value="1" </a:t>
-            </a:r>
-            <a:r>
-              <a:rPr lang="en-CA" dirty="0" smtClean="0"/>
-              <a:t>/&gt;</a:t>
+              <a:t>[1][complete]" type="checkbox" value="1" /&gt;</a:t>
             </a:r>
             <a:br>
               <a:rPr lang="en-CA" dirty="0" smtClean="0"/>
             </a:br>
             <a:r>
               <a:rPr lang="en-CA" dirty="0" smtClean="0"/>
-              <a:t>&lt;</a:t>
-            </a:r>
-            <a:r>
-              <a:rPr lang="en-CA" dirty="0" smtClean="0"/>
-              <a:t>script type="text/</a:t>
+              <a:t>&lt;script type="text/</a:t>
             </a:r>
             <a:r>
               <a:rPr lang="en-CA" dirty="0" err="1" smtClean="0"/>
@@ -4215,11 +4190,7 @@
             </a:r>
             <a:r>
               <a:rPr lang="en-CA" dirty="0" smtClean="0"/>
-              <a:t>(</a:t>
-            </a:r>
-            <a:r>
-              <a:rPr lang="en-CA" dirty="0" smtClean="0"/>
-              <a:t>'</a:t>
+              <a:t>('</a:t>
             </a:r>
             <a:r>
               <a:rPr lang="en-CA" dirty="0" err="1" smtClean="0"/>
@@ -4234,11 +4205,89 @@
             </a:br>
             <a:r>
               <a:rPr lang="en-CA" dirty="0" smtClean="0"/>
+              <a:t>                           if(</a:t>
+            </a:r>
+            <a:r>
+              <a:rPr lang="en-CA" dirty="0" err="1" smtClean="0"/>
+              <a:t>element.checked</a:t>
+            </a:r>
+            <a:r>
+              <a:rPr lang="en-CA" dirty="0" smtClean="0"/>
+              <a:t>){</a:t>
+            </a:r>
+            <a:br>
+              <a:rPr lang="en-CA" dirty="0" smtClean="0"/>
+            </a:br>
+            <a:r>
+              <a:rPr lang="en-CA" dirty="0" smtClean="0"/>
+              <a:t>                              </a:t>
+            </a:r>
+            <a:r>
+              <a:rPr lang="en-CA" dirty="0" err="1" smtClean="0"/>
+              <a:t>li.addClassName</a:t>
+            </a:r>
+            <a:r>
+              <a:rPr lang="en-CA" dirty="0" smtClean="0"/>
+              <a:t>('complete‘)</a:t>
+            </a:r>
+            <a:br>
+              <a:rPr lang="en-CA" dirty="0" smtClean="0"/>
+            </a:br>
+            <a:r>
+              <a:rPr lang="en-CA" dirty="0" smtClean="0"/>
+              <a:t>                           }else{</a:t>
+            </a:r>
+            <a:br>
+              <a:rPr lang="en-CA" dirty="0" smtClean="0"/>
+            </a:br>
+            <a:r>
+              <a:rPr lang="en-CA" dirty="0" smtClean="0"/>
+              <a:t>                              </a:t>
+            </a:r>
+            <a:r>
+              <a:rPr lang="en-CA" dirty="0" err="1" smtClean="0"/>
+              <a:t>li.removeClassName</a:t>
+            </a:r>
+            <a:r>
+              <a:rPr lang="en-CA" dirty="0" smtClean="0"/>
+              <a:t>('complete‘)</a:t>
+            </a:r>
+            <a:br>
+              <a:rPr lang="en-CA" dirty="0" smtClean="0"/>
+            </a:br>
+            <a:r>
+              <a:rPr lang="en-CA" dirty="0" smtClean="0"/>
+              <a:t>                           };</a:t>
+            </a:r>
+            <a:br>
+              <a:rPr lang="en-CA" dirty="0" smtClean="0"/>
+            </a:br>
+            <a:r>
+              <a:rPr lang="en-CA" dirty="0" smtClean="0"/>
               <a:t>                           </a:t>
             </a:r>
             <a:r>
-              <a:rPr lang="en-CA" dirty="0" smtClean="0"/>
-              <a:t>if(</a:t>
+              <a:rPr lang="en-CA" dirty="0" err="1" smtClean="0"/>
+              <a:t>li.highlight</a:t>
+            </a:r>
+            <a:r>
+              <a:rPr lang="en-CA" dirty="0" smtClean="0"/>
+              <a:t>(); </a:t>
+            </a:r>
+            <a:br>
+              <a:rPr lang="en-CA" dirty="0" smtClean="0"/>
+            </a:br>
+            <a:r>
+              <a:rPr lang="en-CA" dirty="0" smtClean="0"/>
+              <a:t>                        }, </a:t>
+            </a:r>
+            <a:r>
+              <a:rPr lang="en-CA" dirty="0" err="1" smtClean="0"/>
+              <a:t>parameters:'todo</a:t>
+            </a:r>
+            <a:r>
+              <a:rPr lang="en-CA" dirty="0" smtClean="0"/>
+              <a:t>[complete]=' + </a:t>
             </a:r>
             <a:r>
               <a:rPr lang="en-CA" dirty="0" err="1" smtClean="0"/>
@@ -4246,180 +4295,58 @@
             </a:r>
             <a:r>
               <a:rPr lang="en-CA" dirty="0" smtClean="0"/>
-              <a:t>){</a:t>
+              <a:t> + '&amp;</a:t>
+            </a:r>
+            <a:r>
+              <a:rPr lang="en-CA" dirty="0" err="1" smtClean="0"/>
+              <a:t>authenticity_token</a:t>
+            </a:r>
+            <a:r>
+              <a:rPr lang="en-CA" dirty="0" smtClean="0"/>
+              <a:t>=' + </a:t>
+            </a:r>
+            <a:r>
+              <a:rPr lang="en-CA" dirty="0" err="1" smtClean="0"/>
+              <a:t>encodeURIComponent</a:t>
+            </a:r>
+            <a:r>
+              <a:rPr lang="en-CA" dirty="0" smtClean="0"/>
+              <a:t>('wNqAr3/4sRWFEV3QAT//L8gNkO35Re2impKlBkbxxYQ=')})})</a:t>
             </a:r>
             <a:br>
               <a:rPr lang="en-CA" dirty="0" smtClean="0"/>
             </a:br>
             <a:r>
               <a:rPr lang="en-CA" dirty="0" smtClean="0"/>
-              <a:t>                              </a:t>
-            </a:r>
-            <a:r>
-              <a:rPr lang="en-CA" dirty="0" err="1" smtClean="0"/>
-              <a:t>li.addClassName</a:t>
-            </a:r>
-            <a:r>
-              <a:rPr lang="en-CA" dirty="0" smtClean="0"/>
-              <a:t>(</a:t>
-            </a:r>
-            <a:r>
-              <a:rPr lang="en-CA" dirty="0" smtClean="0"/>
-              <a:t>'complete‘)</a:t>
+              <a:t/>
             </a:r>
             <a:br>
               <a:rPr lang="en-CA" dirty="0" smtClean="0"/>
             </a:br>
             <a:r>
               <a:rPr lang="en-CA" dirty="0" smtClean="0"/>
-              <a:t>                           </a:t>
-            </a:r>
-            <a:r>
-              <a:rPr lang="en-CA" dirty="0" smtClean="0"/>
-              <a:t>}else</a:t>
-            </a:r>
-            <a:r>
-              <a:rPr lang="en-CA" dirty="0" smtClean="0"/>
-              <a:t>{</a:t>
+              <a:t>//]]&gt;</a:t>
             </a:r>
             <a:br>
               <a:rPr lang="en-CA" dirty="0" smtClean="0"/>
             </a:br>
             <a:r>
               <a:rPr lang="en-CA" dirty="0" smtClean="0"/>
-              <a:t>                              </a:t>
-            </a:r>
-            <a:r>
-              <a:rPr lang="en-CA" dirty="0" err="1" smtClean="0"/>
-              <a:t>li.removeClassName</a:t>
-            </a:r>
-            <a:r>
-              <a:rPr lang="en-CA" dirty="0" smtClean="0"/>
-              <a:t>(</a:t>
-            </a:r>
-            <a:r>
-              <a:rPr lang="en-CA" dirty="0" smtClean="0"/>
-              <a:t>'complete‘)</a:t>
+              <a:t/>
             </a:r>
             <a:br>
               <a:rPr lang="en-CA" dirty="0" smtClean="0"/>
             </a:br>
             <a:r>
               <a:rPr lang="en-CA" dirty="0" smtClean="0"/>
-              <a:t>                           };</a:t>
+              <a:t>&lt;/script&gt;</a:t>
             </a:r>
             <a:br>
               <a:rPr lang="en-CA" dirty="0" smtClean="0"/>
             </a:br>
             <a:r>
               <a:rPr lang="en-CA" dirty="0" smtClean="0"/>
-              <a:t>                           </a:t>
-            </a:r>
-            <a:r>
-              <a:rPr lang="en-CA" dirty="0" err="1" smtClean="0"/>
-              <a:t>li.highlight</a:t>
-            </a:r>
-            <a:r>
-              <a:rPr lang="en-CA" dirty="0" smtClean="0"/>
-              <a:t>(); </a:t>
-            </a:r>
-            <a:r>
-              <a:rPr lang="en-CA" dirty="0" smtClean="0"/>
-              <a:t/>
-            </a:r>
-            <a:br>
-              <a:rPr lang="en-CA" dirty="0" smtClean="0"/>
-            </a:br>
-            <a:r>
-              <a:rPr lang="en-CA" dirty="0" smtClean="0"/>
-              <a:t>                        </a:t>
-            </a:r>
-            <a:r>
-              <a:rPr lang="en-CA" dirty="0" smtClean="0"/>
-              <a:t>}, </a:t>
-            </a:r>
-            <a:r>
-              <a:rPr lang="en-CA" dirty="0" err="1" smtClean="0"/>
-              <a:t>parameters:'todo</a:t>
-            </a:r>
-            <a:r>
-              <a:rPr lang="en-CA" dirty="0" smtClean="0"/>
-              <a:t>[complete]=' + </a:t>
-            </a:r>
-            <a:r>
-              <a:rPr lang="en-CA" dirty="0" err="1" smtClean="0"/>
-              <a:t>element.checked</a:t>
-            </a:r>
-            <a:r>
-              <a:rPr lang="en-CA" dirty="0" smtClean="0"/>
-              <a:t> + '&amp;</a:t>
-            </a:r>
-            <a:r>
-              <a:rPr lang="en-CA" dirty="0" err="1" smtClean="0"/>
-              <a:t>authenticity_token</a:t>
-            </a:r>
-            <a:r>
-              <a:rPr lang="en-CA" dirty="0" smtClean="0"/>
-              <a:t>=' + </a:t>
-            </a:r>
-            <a:r>
-              <a:rPr lang="en-CA" dirty="0" err="1" smtClean="0"/>
-              <a:t>encodeURIComponent</a:t>
-            </a:r>
-            <a:r>
-              <a:rPr lang="en-CA" dirty="0" smtClean="0"/>
-              <a:t>('wNqAr3/4sRWFEV3QAT//L8gNkO35Re2impKlBkbxxYQ</a:t>
-            </a:r>
-            <a:r>
-              <a:rPr lang="en-CA" dirty="0" smtClean="0"/>
-              <a:t>=')})})</a:t>
-            </a:r>
-            <a:br>
-              <a:rPr lang="en-CA" dirty="0" smtClean="0"/>
-            </a:br>
-            <a:r>
-              <a:rPr lang="en-CA" dirty="0" smtClean="0"/>
-              <a:t/>
-            </a:r>
-            <a:br>
-              <a:rPr lang="en-CA" dirty="0" smtClean="0"/>
-            </a:br>
-            <a:r>
-              <a:rPr lang="en-CA" dirty="0" smtClean="0"/>
-              <a:t>//]]&gt;</a:t>
-            </a:r>
-            <a:br>
-              <a:rPr lang="en-CA" dirty="0" smtClean="0"/>
-            </a:br>
-            <a:r>
-              <a:rPr lang="en-CA" dirty="0" smtClean="0"/>
-              <a:t/>
-            </a:r>
-            <a:br>
-              <a:rPr lang="en-CA" dirty="0" smtClean="0"/>
-            </a:br>
-            <a:r>
-              <a:rPr lang="en-CA" dirty="0" smtClean="0"/>
-              <a:t>&lt;/script&gt;</a:t>
-            </a:r>
-            <a:r>
-              <a:rPr lang="en-CA" dirty="0" smtClean="0"/>
-              <a:t/>
-            </a:r>
-            <a:br>
-              <a:rPr lang="en-CA" dirty="0" smtClean="0"/>
-            </a:br>
-            <a:r>
-              <a:rPr lang="en-CA" dirty="0" smtClean="0"/>
-              <a:t>&lt;</a:t>
-            </a:r>
-            <a:r>
-              <a:rPr lang="en-CA" dirty="0" smtClean="0"/>
-              <a:t>span class="name"&gt;Take out Dog&lt;/span</a:t>
-            </a:r>
-            <a:r>
-              <a:rPr lang="en-CA" dirty="0" smtClean="0"/>
-              <a:t>&gt;</a:t>
+              <a:t>&lt;span class="name"&gt;Take out Dog&lt;/span&gt;</a:t>
             </a:r>
           </a:p>
           <a:p>
@@ -4431,26 +4358,14 @@
             </a:pPr>
             <a:r>
               <a:rPr lang="en-CA" dirty="0" smtClean="0"/>
-              <a:t>&lt;</a:t>
-            </a:r>
-            <a:r>
-              <a:rPr lang="en-CA" dirty="0" smtClean="0"/>
-              <a:t>div class="controls</a:t>
-            </a:r>
-            <a:r>
-              <a:rPr lang="en-CA" dirty="0" smtClean="0"/>
-              <a:t>"&gt;</a:t>
+              <a:t>&lt;div class="controls"&gt;</a:t>
             </a:r>
             <a:br>
               <a:rPr lang="en-CA" dirty="0" smtClean="0"/>
             </a:br>
             <a:r>
               <a:rPr lang="en-CA" dirty="0" smtClean="0"/>
-              <a:t>&lt;</a:t>
-            </a:r>
-            <a:r>
-              <a:rPr lang="en-CA" dirty="0" smtClean="0"/>
-              <a:t>a </a:t>
+              <a:t>&lt;a </a:t>
             </a:r>
             <a:r>
               <a:rPr lang="en-CA" dirty="0" err="1" smtClean="0"/>
@@ -4466,11 +4381,7 @@
             </a:r>
             <a:r>
               <a:rPr lang="en-CA" dirty="0" smtClean="0"/>
-              <a:t>/1/edit"&gt;Edit&lt;/a&gt; </a:t>
-            </a:r>
-            <a:r>
-              <a:rPr lang="en-CA" dirty="0" smtClean="0"/>
-              <a:t>|</a:t>
+              <a:t>/1/edit"&gt;Edit&lt;/a&gt; |</a:t>
             </a:r>
             <a:br>
               <a:rPr lang="en-CA" dirty="0" smtClean="0"/>
@@ -4673,15 +4584,7 @@
             </a:pPr>
             <a:r>
               <a:rPr lang="en-CA" dirty="0" smtClean="0"/>
-              <a:t>&lt;/</a:t>
-            </a:r>
-            <a:r>
-              <a:rPr lang="en-CA" dirty="0" smtClean="0"/>
-              <a:t>div</a:t>
-            </a:r>
-            <a:r>
-              <a:rPr lang="en-CA" dirty="0" smtClean="0"/>
-              <a:t>&gt;</a:t>
+              <a:t>&lt;/div&gt;</a:t>
             </a:r>
           </a:p>
           <a:p>
@@ -4747,7 +4650,6 @@
               <a:rPr lang="en-CA" dirty="0" smtClean="0"/>
               <a:t>" id="todo_1"&gt; </a:t>
             </a:r>
-            <a:endParaRPr lang="en-CA" dirty="0" smtClean="0"/>
           </a:p>
           <a:p>
             <a:pPr lvl="1">
@@ -4755,11 +4657,7 @@
             </a:pPr>
             <a:r>
               <a:rPr lang="en-CA" dirty="0" smtClean="0"/>
-              <a:t>&lt;input name</a:t>
-            </a:r>
-            <a:r>
-              <a:rPr lang="en-CA" dirty="0" smtClean="0"/>
-              <a:t>="</a:t>
+              <a:t>&lt;input name="</a:t>
             </a:r>
             <a:r>
               <a:rPr lang="en-CA" dirty="0" err="1" smtClean="0"/>
@@ -4767,11 +4665,7 @@
             </a:r>
             <a:r>
               <a:rPr lang="en-CA" dirty="0" smtClean="0"/>
-              <a:t>[1][complete]" type="hidden" value="0" </a:t>
-            </a:r>
-            <a:r>
-              <a:rPr lang="en-CA" dirty="0" smtClean="0"/>
-              <a:t>/&gt;</a:t>
+              <a:t>[1][complete]" type="hidden" value="0" /&gt;</a:t>
             </a:r>
           </a:p>
           <a:p>
@@ -4780,11 +4674,7 @@
             </a:pPr>
             <a:r>
               <a:rPr lang="en-CA" dirty="0" smtClean="0"/>
-              <a:t>&lt;</a:t>
-            </a:r>
-            <a:r>
-              <a:rPr lang="en-CA" dirty="0" smtClean="0"/>
-              <a:t>input id="todos_1_complete" name="</a:t>
+              <a:t>&lt;input id="todos_1_complete" name="</a:t>
             </a:r>
             <a:r>
               <a:rPr lang="en-CA" dirty="0" err="1" smtClean="0"/>
@@ -4794,7 +4684,6 @@
               <a:rPr lang="en-CA" dirty="0" smtClean="0"/>
               <a:t>[1][complete]" type="checkbox" value="1" /&gt; </a:t>
             </a:r>
-            <a:endParaRPr lang="en-CA" dirty="0" smtClean="0"/>
           </a:p>
           <a:p>
             <a:pPr lvl="1">
@@ -4802,13 +4691,8 @@
             </a:pPr>
             <a:r>
               <a:rPr lang="en-CA" dirty="0" smtClean="0"/>
-              <a:t>&lt;</a:t>
-            </a:r>
-            <a:r>
-              <a:rPr lang="en-CA" dirty="0" smtClean="0"/>
-              <a:t>span class="name"&gt;Take out Dog&lt;/span&gt; </a:t>
-            </a:r>
-            <a:endParaRPr lang="en-CA" dirty="0" smtClean="0"/>
+              <a:t>&lt;span class="name"&gt;Take out Dog&lt;/span&gt; </a:t>
+            </a:r>
           </a:p>
           <a:p>
             <a:pPr lvl="1">
@@ -4816,13 +4700,8 @@
             </a:pPr>
             <a:r>
               <a:rPr lang="en-CA" dirty="0" smtClean="0"/>
-              <a:t>&lt;</a:t>
-            </a:r>
-            <a:r>
-              <a:rPr lang="en-CA" dirty="0" smtClean="0"/>
-              <a:t>div class="controls"&gt; </a:t>
-            </a:r>
-            <a:endParaRPr lang="en-CA" dirty="0" smtClean="0"/>
+              <a:t>&lt;div class="controls"&gt; </a:t>
+            </a:r>
           </a:p>
           <a:p>
             <a:pPr lvl="1">
@@ -4830,15 +4709,7 @@
             </a:pPr>
             <a:r>
               <a:rPr lang="en-CA" dirty="0" smtClean="0"/>
-              <a:t>	</a:t>
-            </a:r>
-            <a:r>
-              <a:rPr lang="en-CA" dirty="0" smtClean="0"/>
-              <a:t>&lt;</a:t>
-            </a:r>
-            <a:r>
-              <a:rPr lang="en-CA" dirty="0" smtClean="0"/>
-              <a:t>a </a:t>
+              <a:t>	&lt;a </a:t>
             </a:r>
             <a:r>
               <a:rPr lang="en-CA" dirty="0" err="1" smtClean="0"/>
@@ -4880,7 +4751,6 @@
               <a:rPr lang="en-CA" dirty="0" smtClean="0"/>
               <a:t>" class="delete"&gt;Delete&lt;/a&gt; </a:t>
             </a:r>
-            <a:endParaRPr lang="en-CA" dirty="0" smtClean="0"/>
           </a:p>
           <a:p>
             <a:pPr lvl="1">
@@ -4888,13 +4758,8 @@
             </a:pPr>
             <a:r>
               <a:rPr lang="en-CA" dirty="0" smtClean="0"/>
-              <a:t>&lt;/</a:t>
-            </a:r>
-            <a:r>
-              <a:rPr lang="en-CA" dirty="0" smtClean="0"/>
-              <a:t>div&gt; </a:t>
-            </a:r>
-            <a:endParaRPr lang="en-CA" dirty="0" smtClean="0"/>
+              <a:t>&lt;/div&gt; </a:t>
+            </a:r>
           </a:p>
           <a:p>
             <a:pPr>
@@ -5067,13 +4932,7 @@
               <a:rPr lang="en-CA" dirty="0" smtClean="0">
                 <a:hlinkClick r:id="rId3"/>
               </a:rPr>
-              <a:t>http://github.com/anlek</a:t>
-            </a:r>
-            <a:r>
-              <a:rPr lang="en-CA" dirty="0" smtClean="0">
-                <a:hlinkClick r:id="rId3"/>
-              </a:rPr>
-              <a:t>/</a:t>
+              <a:t>http://github.com/anlek/</a:t>
             </a:r>
             <a:endParaRPr lang="en-CA" dirty="0" smtClean="0"/>
           </a:p>
@@ -5083,34 +4942,58 @@
           <a:p>
             <a:r>
               <a:rPr lang="en-CA" dirty="0" smtClean="0"/>
-              <a:t>Learn more on Unobtrusive </a:t>
-            </a:r>
-            <a:r>
-              <a:rPr lang="en-CA" dirty="0" err="1" smtClean="0"/>
-              <a:t>Javascript</a:t>
-            </a:r>
-            <a:r>
-              <a:rPr lang="en-CA" dirty="0" smtClean="0"/>
-              <a:t> at:</a:t>
-            </a:r>
-            <a:br>
-              <a:rPr lang="en-CA" dirty="0" smtClean="0"/>
-            </a:br>
-            <a:r>
-              <a:rPr lang="en-CA" dirty="0" smtClean="0"/>
-              <a:t> </a:t>
+              <a:t>Prototype: </a:t>
             </a:r>
             <a:r>
               <a:rPr lang="en-CA" dirty="0" smtClean="0">
                 <a:hlinkClick r:id="rId4"/>
               </a:rPr>
-              <a:t>https://</a:t>
+              <a:t>http://www.prototypejs.org/</a:t>
+            </a:r>
+            <a:endParaRPr lang="en-CA" dirty="0" smtClean="0"/>
+          </a:p>
+          <a:p>
+            <a:r>
+              <a:rPr lang="en-CA" dirty="0" err="1" smtClean="0"/>
+              <a:t>LowPro</a:t>
+            </a:r>
+            <a:r>
+              <a:rPr lang="en-CA" dirty="0" smtClean="0"/>
+              <a:t>:  </a:t>
             </a:r>
             <a:r>
               <a:rPr lang="en-CA" dirty="0" smtClean="0">
-                <a:hlinkClick r:id="rId4"/>
+                <a:hlinkClick r:id="rId5"/>
               </a:rPr>
-              <a:t>peepcode.com/products/unobtrusive-prototype-js</a:t>
+              <a:t>http://www.danwebb.net/lowpro</a:t>
+            </a:r>
+            <a:endParaRPr lang="en-CA" dirty="0" smtClean="0"/>
+          </a:p>
+          <a:p>
+            <a:r>
+              <a:rPr lang="en-CA" dirty="0" smtClean="0"/>
+              <a:t>Learn more on Unobtrusive </a:t>
+            </a:r>
+            <a:r>
+              <a:rPr lang="en-CA" dirty="0" err="1" smtClean="0"/>
+              <a:t>Javascript</a:t>
+            </a:r>
+            <a:r>
+              <a:rPr lang="en-CA" dirty="0" smtClean="0"/>
+              <a:t> at:</a:t>
+            </a:r>
+            <a:br>
+              <a:rPr lang="en-CA" dirty="0" smtClean="0"/>
+            </a:br>
+            <a:r>
+              <a:rPr lang="en-CA" dirty="0" smtClean="0"/>
+              <a:t> </a:t>
+            </a:r>
+            <a:r>
+              <a:rPr lang="en-CA" dirty="0" smtClean="0">
+                <a:hlinkClick r:id="rId6"/>
+              </a:rPr>
+              <a:t>https://peepcode.com/products/unobtrusive-prototype-js</a:t>
             </a:r>
             <a:endParaRPr lang="en-CA" dirty="0" smtClean="0"/>
           </a:p>
@@ -5137,7 +5020,7 @@
 <file path=ppt/theme/theme1.xml><?xml version="1.0" encoding="utf-8"?>
 <a:theme xmlns:a="http://schemas.openxmlformats.org/drawingml/2006/main" name="Median">
   <a:themeElements>
-    <a:clrScheme name="Median">
+    <a:clrScheme name="Unobtrusive JS Presentation">
       <a:dk1>
         <a:sysClr val="windowText" lastClr="000000"/>
       </a:dk1>
@@ -5154,13 +5037,13 @@
         <a:srgbClr val="94B6D2"/>
       </a:accent1>
       <a:accent2>
-        <a:srgbClr val="DD8047"/>
+        <a:srgbClr val="6A0000"/>
       </a:accent2>
       <a:accent3>
         <a:srgbClr val="A5AB81"/>
       </a:accent3>
       <a:accent4>
-        <a:srgbClr val="D8B25C"/>
+        <a:srgbClr val="006A00"/>
       </a:accent4>
       <a:accent5>
         <a:srgbClr val="7BA79D"/>

</xml_diff>